<commit_message>
fix notes from my science supervisor and add math model
</commit_message>
<xml_diff>
--- a/txt/schemes.pptx
+++ b/txt/schemes.pptx
@@ -119,18 +119,18 @@
   <pc:docChgLst>
     <pc:chgData name="Otto Schefer" userId="fd5a25951ba882f8" providerId="LiveId" clId="{01312597-0B54-46BE-906A-F240F5E61C87}"/>
     <pc:docChg chg="undo custSel addSld modSld">
-      <pc:chgData name="Otto Schefer" userId="fd5a25951ba882f8" providerId="LiveId" clId="{01312597-0B54-46BE-906A-F240F5E61C87}" dt="2021-05-15T22:04:56.895" v="187" actId="1076"/>
+      <pc:chgData name="Otto Schefer" userId="fd5a25951ba882f8" providerId="LiveId" clId="{01312597-0B54-46BE-906A-F240F5E61C87}" dt="2021-05-16T20:06:20.592" v="203" actId="404"/>
       <pc:docMkLst>
         <pc:docMk/>
       </pc:docMkLst>
       <pc:sldChg chg="addSp delSp modSp mod">
-        <pc:chgData name="Otto Schefer" userId="fd5a25951ba882f8" providerId="LiveId" clId="{01312597-0B54-46BE-906A-F240F5E61C87}" dt="2021-05-15T22:04:56.895" v="187" actId="1076"/>
+        <pc:chgData name="Otto Schefer" userId="fd5a25951ba882f8" providerId="LiveId" clId="{01312597-0B54-46BE-906A-F240F5E61C87}" dt="2021-05-16T20:05:03.138" v="198" actId="20577"/>
         <pc:sldMkLst>
           <pc:docMk/>
           <pc:sldMk cId="1581449444" sldId="256"/>
         </pc:sldMkLst>
         <pc:spChg chg="mod">
-          <ac:chgData name="Otto Schefer" userId="fd5a25951ba882f8" providerId="LiveId" clId="{01312597-0B54-46BE-906A-F240F5E61C87}" dt="2021-05-15T20:04:55.843" v="60" actId="1076"/>
+          <ac:chgData name="Otto Schefer" userId="fd5a25951ba882f8" providerId="LiveId" clId="{01312597-0B54-46BE-906A-F240F5E61C87}" dt="2021-05-16T20:05:03.138" v="198" actId="20577"/>
           <ac:spMkLst>
             <pc:docMk/>
             <pc:sldMk cId="1581449444" sldId="256"/>
@@ -914,7 +914,7 @@
         </pc:cxnChg>
       </pc:sldChg>
       <pc:sldChg chg="addSp delSp modSp new mod">
-        <pc:chgData name="Otto Schefer" userId="fd5a25951ba882f8" providerId="LiveId" clId="{01312597-0B54-46BE-906A-F240F5E61C87}" dt="2021-05-15T22:04:32.864" v="183" actId="1076"/>
+        <pc:chgData name="Otto Schefer" userId="fd5a25951ba882f8" providerId="LiveId" clId="{01312597-0B54-46BE-906A-F240F5E61C87}" dt="2021-05-16T20:06:20.592" v="203" actId="404"/>
         <pc:sldMkLst>
           <pc:docMk/>
           <pc:sldMk cId="1258381903" sldId="258"/>
@@ -952,7 +952,7 @@
           </ac:spMkLst>
         </pc:spChg>
         <pc:spChg chg="add mod">
-          <ac:chgData name="Otto Schefer" userId="fd5a25951ba882f8" providerId="LiveId" clId="{01312597-0B54-46BE-906A-F240F5E61C87}" dt="2021-05-15T22:00:05.823" v="146"/>
+          <ac:chgData name="Otto Schefer" userId="fd5a25951ba882f8" providerId="LiveId" clId="{01312597-0B54-46BE-906A-F240F5E61C87}" dt="2021-05-16T20:06:20.592" v="203" actId="404"/>
           <ac:spMkLst>
             <pc:docMk/>
             <pc:sldMk cId="1258381903" sldId="258"/>
@@ -1592,7 +1592,7 @@
           <a:p>
             <a:fld id="{083E7580-4A74-4DC1-979A-56FFF28705FF}" type="datetimeFigureOut">
               <a:rPr lang="ru-RU" smtClean="0"/>
-              <a:t>15.05.2021</a:t>
+              <a:t>16.05.2021</a:t>
             </a:fld>
             <a:endParaRPr lang="ru-RU"/>
           </a:p>
@@ -1790,7 +1790,7 @@
           <a:p>
             <a:fld id="{083E7580-4A74-4DC1-979A-56FFF28705FF}" type="datetimeFigureOut">
               <a:rPr lang="ru-RU" smtClean="0"/>
-              <a:t>15.05.2021</a:t>
+              <a:t>16.05.2021</a:t>
             </a:fld>
             <a:endParaRPr lang="ru-RU"/>
           </a:p>
@@ -1998,7 +1998,7 @@
           <a:p>
             <a:fld id="{083E7580-4A74-4DC1-979A-56FFF28705FF}" type="datetimeFigureOut">
               <a:rPr lang="ru-RU" smtClean="0"/>
-              <a:t>15.05.2021</a:t>
+              <a:t>16.05.2021</a:t>
             </a:fld>
             <a:endParaRPr lang="ru-RU"/>
           </a:p>
@@ -2196,7 +2196,7 @@
           <a:p>
             <a:fld id="{083E7580-4A74-4DC1-979A-56FFF28705FF}" type="datetimeFigureOut">
               <a:rPr lang="ru-RU" smtClean="0"/>
-              <a:t>15.05.2021</a:t>
+              <a:t>16.05.2021</a:t>
             </a:fld>
             <a:endParaRPr lang="ru-RU"/>
           </a:p>
@@ -2471,7 +2471,7 @@
           <a:p>
             <a:fld id="{083E7580-4A74-4DC1-979A-56FFF28705FF}" type="datetimeFigureOut">
               <a:rPr lang="ru-RU" smtClean="0"/>
-              <a:t>15.05.2021</a:t>
+              <a:t>16.05.2021</a:t>
             </a:fld>
             <a:endParaRPr lang="ru-RU"/>
           </a:p>
@@ -2736,7 +2736,7 @@
           <a:p>
             <a:fld id="{083E7580-4A74-4DC1-979A-56FFF28705FF}" type="datetimeFigureOut">
               <a:rPr lang="ru-RU" smtClean="0"/>
-              <a:t>15.05.2021</a:t>
+              <a:t>16.05.2021</a:t>
             </a:fld>
             <a:endParaRPr lang="ru-RU"/>
           </a:p>
@@ -3148,7 +3148,7 @@
           <a:p>
             <a:fld id="{083E7580-4A74-4DC1-979A-56FFF28705FF}" type="datetimeFigureOut">
               <a:rPr lang="ru-RU" smtClean="0"/>
-              <a:t>15.05.2021</a:t>
+              <a:t>16.05.2021</a:t>
             </a:fld>
             <a:endParaRPr lang="ru-RU"/>
           </a:p>
@@ -3289,7 +3289,7 @@
           <a:p>
             <a:fld id="{083E7580-4A74-4DC1-979A-56FFF28705FF}" type="datetimeFigureOut">
               <a:rPr lang="ru-RU" smtClean="0"/>
-              <a:t>15.05.2021</a:t>
+              <a:t>16.05.2021</a:t>
             </a:fld>
             <a:endParaRPr lang="ru-RU"/>
           </a:p>
@@ -3402,7 +3402,7 @@
           <a:p>
             <a:fld id="{083E7580-4A74-4DC1-979A-56FFF28705FF}" type="datetimeFigureOut">
               <a:rPr lang="ru-RU" smtClean="0"/>
-              <a:t>15.05.2021</a:t>
+              <a:t>16.05.2021</a:t>
             </a:fld>
             <a:endParaRPr lang="ru-RU"/>
           </a:p>
@@ -3713,7 +3713,7 @@
           <a:p>
             <a:fld id="{083E7580-4A74-4DC1-979A-56FFF28705FF}" type="datetimeFigureOut">
               <a:rPr lang="ru-RU" smtClean="0"/>
-              <a:t>15.05.2021</a:t>
+              <a:t>16.05.2021</a:t>
             </a:fld>
             <a:endParaRPr lang="ru-RU"/>
           </a:p>
@@ -4001,7 +4001,7 @@
           <a:p>
             <a:fld id="{083E7580-4A74-4DC1-979A-56FFF28705FF}" type="datetimeFigureOut">
               <a:rPr lang="ru-RU" smtClean="0"/>
-              <a:t>15.05.2021</a:t>
+              <a:t>16.05.2021</a:t>
             </a:fld>
             <a:endParaRPr lang="ru-RU"/>
           </a:p>
@@ -4242,7 +4242,7 @@
           <a:p>
             <a:fld id="{083E7580-4A74-4DC1-979A-56FFF28705FF}" type="datetimeFigureOut">
               <a:rPr lang="ru-RU" smtClean="0"/>
-              <a:t>15.05.2021</a:t>
+              <a:t>16.05.2021</a:t>
             </a:fld>
             <a:endParaRPr lang="ru-RU"/>
           </a:p>
@@ -4958,7 +4958,7 @@
             <p:spPr>
               <a:xfrm>
                 <a:off x="6019034" y="1873473"/>
-                <a:ext cx="652007" cy="898323"/>
+                <a:ext cx="652007" cy="790666"/>
               </a:xfrm>
               <a:prstGeom prst="rect">
                 <a:avLst/>
@@ -4981,7 +4981,7 @@
                       <m:f>
                         <m:fPr>
                           <m:ctrlPr>
-                            <a:rPr lang="ru-RU" sz="1400" i="1" smtClean="0">
+                            <a:rPr lang="ru-RU" sz="1100" i="1" smtClean="0">
                               <a:effectLst/>
                               <a:latin typeface="Cambria Math" panose="02040503050406030204" pitchFamily="18" charset="0"/>
                               <a:ea typeface="Calibri" panose="020F0502020204030204" pitchFamily="34" charset="0"/>
@@ -4991,20 +4991,21 @@
                         </m:fPr>
                         <m:num>
                           <m:r>
-                            <a:rPr lang="en-US" sz="1400" i="1">
-                              <a:effectLst/>
+                            <m:rPr>
+                              <m:sty m:val="p"/>
+                            </m:rPr>
+                            <a:rPr lang="ru-RU" sz="1400">
                               <a:latin typeface="Cambria Math" panose="02040503050406030204" pitchFamily="18" charset="0"/>
-                              <a:ea typeface="Calibri" panose="020F0502020204030204" pitchFamily="34" charset="0"/>
-                              <a:cs typeface="Times New Roman" panose="02020603050405020304" pitchFamily="18" charset="0"/>
+                              <a:ea typeface="Cambria Math" panose="02040503050406030204" pitchFamily="18" charset="0"/>
                             </a:rPr>
-                            <m:t>1</m:t>
+                            <m:t>ε</m:t>
                           </m:r>
                         </m:num>
                         <m:den>
                           <m:sSub>
                             <m:sSubPr>
                               <m:ctrlPr>
-                                <a:rPr lang="ru-RU" sz="1400" i="1">
+                                <a:rPr lang="ru-RU" sz="1100" i="1">
                                   <a:effectLst/>
                                   <a:latin typeface="Cambria Math" panose="02040503050406030204" pitchFamily="18" charset="0"/>
                                   <a:ea typeface="Calibri" panose="020F0502020204030204" pitchFamily="34" charset="0"/>
@@ -5014,7 +5015,7 @@
                             </m:sSubPr>
                             <m:e>
                               <m:r>
-                                <a:rPr lang="ru-RU" sz="1400" b="0" i="1" smtClean="0">
+                                <a:rPr lang="ru-RU" sz="1100" b="0" i="1" smtClean="0">
                                   <a:effectLst/>
                                   <a:latin typeface="Cambria Math" panose="02040503050406030204" pitchFamily="18" charset="0"/>
                                   <a:ea typeface="Calibri" panose="020F0502020204030204" pitchFamily="34" charset="0"/>
@@ -5023,7 +5024,7 @@
                                 <m:t>(</m:t>
                               </m:r>
                               <m:r>
-                                <a:rPr lang="en-US" sz="1400" i="1">
+                                <a:rPr lang="en-US" sz="1100" i="1">
                                   <a:effectLst/>
                                   <a:latin typeface="Cambria Math" panose="02040503050406030204" pitchFamily="18" charset="0"/>
                                   <a:ea typeface="Calibri" panose="020F0502020204030204" pitchFamily="34" charset="0"/>
@@ -5034,7 +5035,7 @@
                             </m:e>
                             <m:sub>
                               <m:r>
-                                <a:rPr lang="ru-RU" sz="1400" b="0" i="1" smtClean="0">
+                                <a:rPr lang="ru-RU" sz="1100" b="0" i="1" smtClean="0">
                                   <a:effectLst/>
                                   <a:latin typeface="Cambria Math" panose="02040503050406030204" pitchFamily="18" charset="0"/>
                                   <a:ea typeface="Calibri" panose="020F0502020204030204" pitchFamily="34" charset="0"/>
@@ -5045,7 +5046,7 @@
                             </m:sub>
                           </m:sSub>
                           <m:r>
-                            <a:rPr lang="ru-RU" sz="1400" b="0" i="1" smtClean="0">
+                            <a:rPr lang="ru-RU" sz="1100" b="0" i="1" smtClean="0">
                               <a:effectLst/>
                               <a:latin typeface="Cambria Math" panose="02040503050406030204" pitchFamily="18" charset="0"/>
                               <a:ea typeface="Calibri" panose="020F0502020204030204" pitchFamily="34" charset="0"/>
@@ -5056,7 +5057,7 @@
                           <m:sSub>
                             <m:sSubPr>
                               <m:ctrlPr>
-                                <a:rPr lang="ru-RU" sz="1400" i="1">
+                                <a:rPr lang="ru-RU" sz="1100" i="1">
                                   <a:latin typeface="Cambria Math" panose="02040503050406030204" pitchFamily="18" charset="0"/>
                                   <a:ea typeface="Calibri" panose="020F0502020204030204" pitchFamily="34" charset="0"/>
                                   <a:cs typeface="Times New Roman" panose="02020603050405020304" pitchFamily="18" charset="0"/>
@@ -5065,7 +5066,7 @@
                             </m:sSubPr>
                             <m:e>
                               <m:r>
-                                <a:rPr lang="en-US" sz="1400" i="1">
+                                <a:rPr lang="en-US" sz="1100" i="1">
                                   <a:latin typeface="Cambria Math" panose="02040503050406030204" pitchFamily="18" charset="0"/>
                                   <a:ea typeface="Calibri" panose="020F0502020204030204" pitchFamily="34" charset="0"/>
                                   <a:cs typeface="Times New Roman" panose="02020603050405020304" pitchFamily="18" charset="0"/>
@@ -5075,7 +5076,7 @@
                             </m:e>
                             <m:sub>
                               <m:r>
-                                <a:rPr lang="ru-RU" sz="1400" b="0" i="1" smtClean="0">
+                                <a:rPr lang="ru-RU" sz="1100" b="0" i="1" smtClean="0">
                                   <a:latin typeface="Cambria Math" panose="02040503050406030204" pitchFamily="18" charset="0"/>
                                   <a:ea typeface="Calibri" panose="020F0502020204030204" pitchFamily="34" charset="0"/>
                                   <a:cs typeface="Times New Roman" panose="02020603050405020304" pitchFamily="18" charset="0"/>
@@ -5085,7 +5086,7 @@
                             </m:sub>
                           </m:sSub>
                           <m:r>
-                            <a:rPr lang="ru-RU" sz="1400" b="0" i="1" smtClean="0">
+                            <a:rPr lang="ru-RU" sz="1100" b="0" i="1" smtClean="0">
                               <a:effectLst/>
                               <a:latin typeface="Cambria Math" panose="02040503050406030204" pitchFamily="18" charset="0"/>
                               <a:ea typeface="Calibri" panose="020F0502020204030204" pitchFamily="34" charset="0"/>
@@ -5094,7 +5095,7 @@
                             <m:t>)</m:t>
                           </m:r>
                           <m:r>
-                            <a:rPr lang="en-US" sz="1400" i="1">
+                            <a:rPr lang="en-US" sz="1100" i="1">
                               <a:effectLst/>
                               <a:latin typeface="Cambria Math" panose="02040503050406030204" pitchFamily="18" charset="0"/>
                               <a:ea typeface="Calibri" panose="020F0502020204030204" pitchFamily="34" charset="0"/>
@@ -5146,7 +5147,7 @@
             <p:spPr>
               <a:xfrm>
                 <a:off x="6019034" y="1873473"/>
-                <a:ext cx="652007" cy="898323"/>
+                <a:ext cx="652007" cy="790666"/>
               </a:xfrm>
               <a:prstGeom prst="rect">
                 <a:avLst/>
@@ -5154,7 +5155,7 @@
               <a:blipFill>
                 <a:blip r:embed="rId4"/>
                 <a:stretch>
-                  <a:fillRect l="-11215" r="-5607"/>
+                  <a:fillRect/>
                 </a:stretch>
               </a:blipFill>
             </p:spPr>
@@ -6491,8 +6492,8 @@
           </a:fontRef>
         </p:style>
       </p:cxnSp>
-      <mc:AlternateContent xmlns:mc="http://schemas.openxmlformats.org/markup-compatibility/2006">
-        <mc:Choice xmlns:a14="http://schemas.microsoft.com/office/drawing/2010/main" Requires="a14">
+      <mc:AlternateContent xmlns:mc="http://schemas.openxmlformats.org/markup-compatibility/2006" xmlns:a14="http://schemas.microsoft.com/office/drawing/2010/main">
+        <mc:Choice Requires="a14">
           <p:sp>
             <p:nvSpPr>
               <p:cNvPr id="82" name="TextBox 81">
@@ -6578,7 +6579,7 @@
             </p:txBody>
           </p:sp>
         </mc:Choice>
-        <mc:Fallback>
+        <mc:Fallback xmlns="">
           <p:sp>
             <p:nvSpPr>
               <p:cNvPr id="82" name="TextBox 81">
@@ -6826,8 +6827,8 @@
           </a:p>
         </p:txBody>
       </p:sp>
-      <mc:AlternateContent xmlns:mc="http://schemas.openxmlformats.org/markup-compatibility/2006">
-        <mc:Choice xmlns:a14="http://schemas.microsoft.com/office/drawing/2010/main" Requires="a14">
+      <mc:AlternateContent xmlns:mc="http://schemas.openxmlformats.org/markup-compatibility/2006" xmlns:a14="http://schemas.microsoft.com/office/drawing/2010/main">
+        <mc:Choice Requires="a14">
           <p:sp>
             <p:nvSpPr>
               <p:cNvPr id="95" name="TextBox 94">
@@ -6913,7 +6914,7 @@
             </p:txBody>
           </p:sp>
         </mc:Choice>
-        <mc:Fallback>
+        <mc:Fallback xmlns="">
           <p:sp>
             <p:nvSpPr>
               <p:cNvPr id="95" name="TextBox 94">
@@ -7137,8 +7138,8 @@
           </a:fontRef>
         </p:style>
       </p:cxnSp>
-      <mc:AlternateContent xmlns:mc="http://schemas.openxmlformats.org/markup-compatibility/2006">
-        <mc:Choice xmlns:a14="http://schemas.microsoft.com/office/drawing/2010/main" Requires="a14">
+      <mc:AlternateContent xmlns:mc="http://schemas.openxmlformats.org/markup-compatibility/2006" xmlns:a14="http://schemas.microsoft.com/office/drawing/2010/main">
+        <mc:Choice Requires="a14">
           <p:sp>
             <p:nvSpPr>
               <p:cNvPr id="43" name="TextBox 42">
@@ -7226,7 +7227,7 @@
             </p:txBody>
           </p:sp>
         </mc:Choice>
-        <mc:Fallback>
+        <mc:Fallback xmlns="">
           <p:sp>
             <p:nvSpPr>
               <p:cNvPr id="43" name="TextBox 42">
@@ -7271,8 +7272,8 @@
           </p:sp>
         </mc:Fallback>
       </mc:AlternateContent>
-      <mc:AlternateContent xmlns:mc="http://schemas.openxmlformats.org/markup-compatibility/2006">
-        <mc:Choice xmlns:a14="http://schemas.microsoft.com/office/drawing/2010/main" Requires="a14">
+      <mc:AlternateContent xmlns:mc="http://schemas.openxmlformats.org/markup-compatibility/2006" xmlns:a14="http://schemas.microsoft.com/office/drawing/2010/main">
+        <mc:Choice Requires="a14">
           <p:sp>
             <p:nvSpPr>
               <p:cNvPr id="44" name="TextBox 43">
@@ -7333,7 +7334,7 @@
             </p:txBody>
           </p:sp>
         </mc:Choice>
-        <mc:Fallback>
+        <mc:Fallback xmlns="">
           <p:sp>
             <p:nvSpPr>
               <p:cNvPr id="44" name="TextBox 43">
@@ -7406,7 +7407,6 @@
           </a:bodyPr>
           <a:lstStyle/>
           <a:p>
-            <a:pPr/>
             <a:endParaRPr lang="ru-RU" sz="1400" dirty="0">
               <a:effectLst/>
               <a:latin typeface="Times New Roman" panose="02020603050405020304" pitchFamily="18" charset="0"/>
@@ -7419,8 +7419,8 @@
           </a:p>
         </p:txBody>
       </p:sp>
-      <mc:AlternateContent xmlns:mc="http://schemas.openxmlformats.org/markup-compatibility/2006">
-        <mc:Choice xmlns:a14="http://schemas.microsoft.com/office/drawing/2010/main" Requires="a14">
+      <mc:AlternateContent xmlns:mc="http://schemas.openxmlformats.org/markup-compatibility/2006" xmlns:a14="http://schemas.microsoft.com/office/drawing/2010/main">
+        <mc:Choice Requires="a14">
           <p:sp>
             <p:nvSpPr>
               <p:cNvPr id="47" name="TextBox 46">
@@ -7504,7 +7504,7 @@
             </p:txBody>
           </p:sp>
         </mc:Choice>
-        <mc:Fallback>
+        <mc:Fallback xmlns="">
           <p:sp>
             <p:nvSpPr>
               <p:cNvPr id="47" name="TextBox 46">
@@ -7549,8 +7549,8 @@
           </p:sp>
         </mc:Fallback>
       </mc:AlternateContent>
-      <mc:AlternateContent xmlns:mc="http://schemas.openxmlformats.org/markup-compatibility/2006">
-        <mc:Choice xmlns:a14="http://schemas.microsoft.com/office/drawing/2010/main" Requires="a14">
+      <mc:AlternateContent xmlns:mc="http://schemas.openxmlformats.org/markup-compatibility/2006" xmlns:a14="http://schemas.microsoft.com/office/drawing/2010/main">
+        <mc:Choice Requires="a14">
           <p:sp>
             <p:nvSpPr>
               <p:cNvPr id="48" name="TextBox 47">
@@ -7611,7 +7611,7 @@
             </p:txBody>
           </p:sp>
         </mc:Choice>
-        <mc:Fallback>
+        <mc:Fallback xmlns="">
           <p:sp>
             <p:nvSpPr>
               <p:cNvPr id="48" name="TextBox 47">
@@ -7656,8 +7656,8 @@
           </p:sp>
         </mc:Fallback>
       </mc:AlternateContent>
-      <mc:AlternateContent xmlns:mc="http://schemas.openxmlformats.org/markup-compatibility/2006">
-        <mc:Choice xmlns:a14="http://schemas.microsoft.com/office/drawing/2010/main" Requires="a14">
+      <mc:AlternateContent xmlns:mc="http://schemas.openxmlformats.org/markup-compatibility/2006" xmlns:a14="http://schemas.microsoft.com/office/drawing/2010/main">
+        <mc:Choice Requires="a14">
           <p:sp>
             <p:nvSpPr>
               <p:cNvPr id="49" name="TextBox 48">
@@ -7751,7 +7751,7 @@
             </p:txBody>
           </p:sp>
         </mc:Choice>
-        <mc:Fallback>
+        <mc:Fallback xmlns="">
           <p:sp>
             <p:nvSpPr>
               <p:cNvPr id="49" name="TextBox 48">
@@ -7890,8 +7890,8 @@
           </a:fontRef>
         </p:style>
       </p:cxnSp>
-      <mc:AlternateContent xmlns:mc="http://schemas.openxmlformats.org/markup-compatibility/2006">
-        <mc:Choice xmlns:a14="http://schemas.microsoft.com/office/drawing/2010/main" Requires="a14">
+      <mc:AlternateContent xmlns:mc="http://schemas.openxmlformats.org/markup-compatibility/2006" xmlns:a14="http://schemas.microsoft.com/office/drawing/2010/main">
+        <mc:Choice Requires="a14">
           <p:sp>
             <p:nvSpPr>
               <p:cNvPr id="52" name="TextBox 51">
@@ -7979,7 +7979,7 @@
             </p:txBody>
           </p:sp>
         </mc:Choice>
-        <mc:Fallback>
+        <mc:Fallback xmlns="">
           <p:sp>
             <p:nvSpPr>
               <p:cNvPr id="52" name="TextBox 51">
@@ -8024,8 +8024,8 @@
           </p:sp>
         </mc:Fallback>
       </mc:AlternateContent>
-      <mc:AlternateContent xmlns:mc="http://schemas.openxmlformats.org/markup-compatibility/2006">
-        <mc:Choice xmlns:a14="http://schemas.microsoft.com/office/drawing/2010/main" Requires="a14">
+      <mc:AlternateContent xmlns:mc="http://schemas.openxmlformats.org/markup-compatibility/2006" xmlns:a14="http://schemas.microsoft.com/office/drawing/2010/main">
+        <mc:Choice Requires="a14">
           <p:sp>
             <p:nvSpPr>
               <p:cNvPr id="53" name="TextBox 52">
@@ -8088,7 +8088,7 @@
             </p:txBody>
           </p:sp>
         </mc:Choice>
-        <mc:Fallback>
+        <mc:Fallback xmlns="">
           <p:sp>
             <p:nvSpPr>
               <p:cNvPr id="53" name="TextBox 52">
@@ -8133,8 +8133,8 @@
           </p:sp>
         </mc:Fallback>
       </mc:AlternateContent>
-      <mc:AlternateContent xmlns:mc="http://schemas.openxmlformats.org/markup-compatibility/2006">
-        <mc:Choice xmlns:a14="http://schemas.microsoft.com/office/drawing/2010/main" Requires="a14">
+      <mc:AlternateContent xmlns:mc="http://schemas.openxmlformats.org/markup-compatibility/2006" xmlns:a14="http://schemas.microsoft.com/office/drawing/2010/main">
+        <mc:Choice Requires="a14">
           <p:sp>
             <p:nvSpPr>
               <p:cNvPr id="63" name="TextBox 62">
@@ -8238,7 +8238,7 @@
             </p:txBody>
           </p:sp>
         </mc:Choice>
-        <mc:Fallback>
+        <mc:Fallback xmlns="">
           <p:sp>
             <p:nvSpPr>
               <p:cNvPr id="63" name="TextBox 62">
@@ -8424,8 +8424,8 @@
           </a:fontRef>
         </p:style>
       </p:cxnSp>
-      <mc:AlternateContent xmlns:mc="http://schemas.openxmlformats.org/markup-compatibility/2006">
-        <mc:Choice xmlns:a14="http://schemas.microsoft.com/office/drawing/2010/main" Requires="a14">
+      <mc:AlternateContent xmlns:mc="http://schemas.openxmlformats.org/markup-compatibility/2006" xmlns:a14="http://schemas.microsoft.com/office/drawing/2010/main">
+        <mc:Choice Requires="a14">
           <p:sp>
             <p:nvSpPr>
               <p:cNvPr id="91" name="TextBox 90">
@@ -8454,6 +8454,7 @@
               </a:bodyPr>
               <a:lstStyle/>
               <a:p>
+                <a:pPr/>
                 <a14:m>
                   <m:oMathPara xmlns:m="http://schemas.openxmlformats.org/officeDocument/2006/math">
                     <m:oMathParaPr>
@@ -8511,7 +8512,6 @@
                 <a:endParaRPr lang="ru-RU" dirty="0"/>
               </a:p>
               <a:p>
-                <a:pPr/>
                 <a:endParaRPr lang="ru-RU" sz="1400" dirty="0">
                   <a:effectLst/>
                   <a:latin typeface="Times New Roman" panose="02020603050405020304" pitchFamily="18" charset="0"/>
@@ -8525,7 +8525,7 @@
             </p:txBody>
           </p:sp>
         </mc:Choice>
-        <mc:Fallback>
+        <mc:Fallback xmlns="">
           <p:sp>
             <p:nvSpPr>
               <p:cNvPr id="91" name="TextBox 90">
@@ -8758,8 +8758,8 @@
           </a:fontRef>
         </p:style>
       </p:cxnSp>
-      <mc:AlternateContent xmlns:mc="http://schemas.openxmlformats.org/markup-compatibility/2006">
-        <mc:Choice xmlns:a14="http://schemas.microsoft.com/office/drawing/2010/main" Requires="a14">
+      <mc:AlternateContent xmlns:mc="http://schemas.openxmlformats.org/markup-compatibility/2006" xmlns:a14="http://schemas.microsoft.com/office/drawing/2010/main">
+        <mc:Choice Requires="a14">
           <p:sp>
             <p:nvSpPr>
               <p:cNvPr id="102" name="TextBox 101">
@@ -8819,7 +8819,7 @@
             </p:txBody>
           </p:sp>
         </mc:Choice>
-        <mc:Fallback>
+        <mc:Fallback xmlns="">
           <p:sp>
             <p:nvSpPr>
               <p:cNvPr id="102" name="TextBox 101">
@@ -8864,8 +8864,8 @@
           </p:sp>
         </mc:Fallback>
       </mc:AlternateContent>
-      <mc:AlternateContent xmlns:mc="http://schemas.openxmlformats.org/markup-compatibility/2006">
-        <mc:Choice xmlns:a14="http://schemas.microsoft.com/office/drawing/2010/main" Requires="a14">
+      <mc:AlternateContent xmlns:mc="http://schemas.openxmlformats.org/markup-compatibility/2006" xmlns:a14="http://schemas.microsoft.com/office/drawing/2010/main">
+        <mc:Choice Requires="a14">
           <p:sp>
             <p:nvSpPr>
               <p:cNvPr id="103" name="TextBox 102">
@@ -8925,7 +8925,7 @@
             </p:txBody>
           </p:sp>
         </mc:Choice>
-        <mc:Fallback>
+        <mc:Fallback xmlns="">
           <p:sp>
             <p:nvSpPr>
               <p:cNvPr id="103" name="TextBox 102">
@@ -8970,8 +8970,8 @@
           </p:sp>
         </mc:Fallback>
       </mc:AlternateContent>
-      <mc:AlternateContent xmlns:mc="http://schemas.openxmlformats.org/markup-compatibility/2006">
-        <mc:Choice xmlns:a14="http://schemas.microsoft.com/office/drawing/2010/main" Requires="a14">
+      <mc:AlternateContent xmlns:mc="http://schemas.openxmlformats.org/markup-compatibility/2006" xmlns:a14="http://schemas.microsoft.com/office/drawing/2010/main">
+        <mc:Choice Requires="a14">
           <p:sp>
             <p:nvSpPr>
               <p:cNvPr id="104" name="TextBox 103">
@@ -9031,7 +9031,7 @@
             </p:txBody>
           </p:sp>
         </mc:Choice>
-        <mc:Fallback>
+        <mc:Fallback xmlns="">
           <p:sp>
             <p:nvSpPr>
               <p:cNvPr id="104" name="TextBox 103">
@@ -9106,8 +9106,8 @@
           <a:chExt cx="0" cy="0"/>
         </a:xfrm>
       </p:grpSpPr>
-      <mc:AlternateContent xmlns:mc="http://schemas.openxmlformats.org/markup-compatibility/2006">
-        <mc:Choice xmlns:a14="http://schemas.microsoft.com/office/drawing/2010/main" Requires="a14">
+      <mc:AlternateContent xmlns:mc="http://schemas.openxmlformats.org/markup-compatibility/2006" xmlns:a14="http://schemas.microsoft.com/office/drawing/2010/main">
+        <mc:Choice Requires="a14">
           <p:sp>
             <p:nvSpPr>
               <p:cNvPr id="5" name="TextBox 4">
@@ -9211,7 +9211,7 @@
             </p:txBody>
           </p:sp>
         </mc:Choice>
-        <mc:Fallback>
+        <mc:Fallback xmlns="">
           <p:sp>
             <p:nvSpPr>
               <p:cNvPr id="5" name="TextBox 4">
@@ -9256,8 +9256,8 @@
           </p:sp>
         </mc:Fallback>
       </mc:AlternateContent>
-      <mc:AlternateContent xmlns:mc="http://schemas.openxmlformats.org/markup-compatibility/2006">
-        <mc:Choice xmlns:a14="http://schemas.microsoft.com/office/drawing/2010/main" Requires="a14">
+      <mc:AlternateContent xmlns:mc="http://schemas.openxmlformats.org/markup-compatibility/2006" xmlns:a14="http://schemas.microsoft.com/office/drawing/2010/main">
+        <mc:Choice Requires="a14">
           <p:sp>
             <p:nvSpPr>
               <p:cNvPr id="6" name="TextBox 5">
@@ -9343,7 +9343,7 @@
             </p:txBody>
           </p:sp>
         </mc:Choice>
-        <mc:Fallback>
+        <mc:Fallback xmlns="">
           <p:sp>
             <p:nvSpPr>
               <p:cNvPr id="6" name="TextBox 5">
@@ -9388,8 +9388,8 @@
           </p:sp>
         </mc:Fallback>
       </mc:AlternateContent>
-      <mc:AlternateContent xmlns:mc="http://schemas.openxmlformats.org/markup-compatibility/2006">
-        <mc:Choice xmlns:a14="http://schemas.microsoft.com/office/drawing/2010/main" Requires="a14">
+      <mc:AlternateContent xmlns:mc="http://schemas.openxmlformats.org/markup-compatibility/2006" xmlns:a14="http://schemas.microsoft.com/office/drawing/2010/main">
+        <mc:Choice Requires="a14">
           <p:sp>
             <p:nvSpPr>
               <p:cNvPr id="7" name="TextBox 6">
@@ -9575,7 +9575,7 @@
             </p:txBody>
           </p:sp>
         </mc:Choice>
-        <mc:Fallback>
+        <mc:Fallback xmlns="">
           <p:sp>
             <p:nvSpPr>
               <p:cNvPr id="7" name="TextBox 6">
@@ -9620,8 +9620,8 @@
           </p:sp>
         </mc:Fallback>
       </mc:AlternateContent>
-      <mc:AlternateContent xmlns:mc="http://schemas.openxmlformats.org/markup-compatibility/2006">
-        <mc:Choice xmlns:a14="http://schemas.microsoft.com/office/drawing/2010/main" Requires="a14">
+      <mc:AlternateContent xmlns:mc="http://schemas.openxmlformats.org/markup-compatibility/2006" xmlns:a14="http://schemas.microsoft.com/office/drawing/2010/main">
+        <mc:Choice Requires="a14">
           <p:sp>
             <p:nvSpPr>
               <p:cNvPr id="8" name="TextBox 7">
@@ -9715,7 +9715,7 @@
             </p:txBody>
           </p:sp>
         </mc:Choice>
-        <mc:Fallback>
+        <mc:Fallback xmlns="">
           <p:sp>
             <p:nvSpPr>
               <p:cNvPr id="8" name="TextBox 7">
@@ -9760,8 +9760,8 @@
           </p:sp>
         </mc:Fallback>
       </mc:AlternateContent>
-      <mc:AlternateContent xmlns:mc="http://schemas.openxmlformats.org/markup-compatibility/2006">
-        <mc:Choice xmlns:a14="http://schemas.microsoft.com/office/drawing/2010/main" Requires="a14">
+      <mc:AlternateContent xmlns:mc="http://schemas.openxmlformats.org/markup-compatibility/2006" xmlns:a14="http://schemas.microsoft.com/office/drawing/2010/main">
+        <mc:Choice Requires="a14">
           <p:sp>
             <p:nvSpPr>
               <p:cNvPr id="9" name="TextBox 8">
@@ -9865,7 +9865,7 @@
             </p:txBody>
           </p:sp>
         </mc:Choice>
-        <mc:Fallback>
+        <mc:Fallback xmlns="">
           <p:sp>
             <p:nvSpPr>
               <p:cNvPr id="9" name="TextBox 8">
@@ -10120,8 +10120,8 @@
           </a:p>
         </p:txBody>
       </p:sp>
-      <mc:AlternateContent xmlns:mc="http://schemas.openxmlformats.org/markup-compatibility/2006">
-        <mc:Choice xmlns:a14="http://schemas.microsoft.com/office/drawing/2010/main" Requires="a14">
+      <mc:AlternateContent xmlns:mc="http://schemas.openxmlformats.org/markup-compatibility/2006" xmlns:a14="http://schemas.microsoft.com/office/drawing/2010/main">
+        <mc:Choice Requires="a14">
           <p:sp>
             <p:nvSpPr>
               <p:cNvPr id="20" name="TextBox 19">
@@ -10207,7 +10207,7 @@
             </p:txBody>
           </p:sp>
         </mc:Choice>
-        <mc:Fallback>
+        <mc:Fallback xmlns="">
           <p:sp>
             <p:nvSpPr>
               <p:cNvPr id="20" name="TextBox 19">
@@ -10678,8 +10678,8 @@
           </a:fontRef>
         </p:style>
       </p:cxnSp>
-      <mc:AlternateContent xmlns:mc="http://schemas.openxmlformats.org/markup-compatibility/2006">
-        <mc:Choice xmlns:a14="http://schemas.microsoft.com/office/drawing/2010/main" Requires="a14">
+      <mc:AlternateContent xmlns:mc="http://schemas.openxmlformats.org/markup-compatibility/2006" xmlns:a14="http://schemas.microsoft.com/office/drawing/2010/main">
+        <mc:Choice Requires="a14">
           <p:sp>
             <p:nvSpPr>
               <p:cNvPr id="30" name="TextBox 29">
@@ -10765,7 +10765,7 @@
             </p:txBody>
           </p:sp>
         </mc:Choice>
-        <mc:Fallback>
+        <mc:Fallback xmlns="">
           <p:sp>
             <p:nvSpPr>
               <p:cNvPr id="30" name="TextBox 29">
@@ -11104,8 +11104,8 @@
           </a:p>
         </p:txBody>
       </p:sp>
-      <mc:AlternateContent xmlns:mc="http://schemas.openxmlformats.org/markup-compatibility/2006">
-        <mc:Choice xmlns:a14="http://schemas.microsoft.com/office/drawing/2010/main" Requires="a14">
+      <mc:AlternateContent xmlns:mc="http://schemas.openxmlformats.org/markup-compatibility/2006" xmlns:a14="http://schemas.microsoft.com/office/drawing/2010/main">
+        <mc:Choice Requires="a14">
           <p:sp>
             <p:nvSpPr>
               <p:cNvPr id="37" name="TextBox 36">
@@ -11191,7 +11191,7 @@
             </p:txBody>
           </p:sp>
         </mc:Choice>
-        <mc:Fallback>
+        <mc:Fallback xmlns="">
           <p:sp>
             <p:nvSpPr>
               <p:cNvPr id="37" name="TextBox 36">
@@ -11418,8 +11418,8 @@
           </a:fontRef>
         </p:style>
       </p:cxnSp>
-      <mc:AlternateContent xmlns:mc="http://schemas.openxmlformats.org/markup-compatibility/2006">
-        <mc:Choice xmlns:a14="http://schemas.microsoft.com/office/drawing/2010/main" Requires="a14">
+      <mc:AlternateContent xmlns:mc="http://schemas.openxmlformats.org/markup-compatibility/2006" xmlns:a14="http://schemas.microsoft.com/office/drawing/2010/main">
+        <mc:Choice Requires="a14">
           <p:sp>
             <p:nvSpPr>
               <p:cNvPr id="43" name="TextBox 42">
@@ -11507,7 +11507,7 @@
             </p:txBody>
           </p:sp>
         </mc:Choice>
-        <mc:Fallback>
+        <mc:Fallback xmlns="">
           <p:sp>
             <p:nvSpPr>
               <p:cNvPr id="43" name="TextBox 42">
@@ -11552,8 +11552,8 @@
           </p:sp>
         </mc:Fallback>
       </mc:AlternateContent>
-      <mc:AlternateContent xmlns:mc="http://schemas.openxmlformats.org/markup-compatibility/2006">
-        <mc:Choice xmlns:a14="http://schemas.microsoft.com/office/drawing/2010/main" Requires="a14">
+      <mc:AlternateContent xmlns:mc="http://schemas.openxmlformats.org/markup-compatibility/2006" xmlns:a14="http://schemas.microsoft.com/office/drawing/2010/main">
+        <mc:Choice Requires="a14">
           <p:sp>
             <p:nvSpPr>
               <p:cNvPr id="44" name="TextBox 43">
@@ -11614,7 +11614,7 @@
             </p:txBody>
           </p:sp>
         </mc:Choice>
-        <mc:Fallback>
+        <mc:Fallback xmlns="">
           <p:sp>
             <p:nvSpPr>
               <p:cNvPr id="44" name="TextBox 43">
@@ -11687,7 +11687,6 @@
           </a:bodyPr>
           <a:lstStyle/>
           <a:p>
-            <a:pPr/>
             <a:endParaRPr lang="ru-RU" sz="1400" dirty="0">
               <a:effectLst/>
               <a:latin typeface="Times New Roman" panose="02020603050405020304" pitchFamily="18" charset="0"/>
@@ -11700,8 +11699,8 @@
           </a:p>
         </p:txBody>
       </p:sp>
-      <mc:AlternateContent xmlns:mc="http://schemas.openxmlformats.org/markup-compatibility/2006">
-        <mc:Choice xmlns:a14="http://schemas.microsoft.com/office/drawing/2010/main" Requires="a14">
+      <mc:AlternateContent xmlns:mc="http://schemas.openxmlformats.org/markup-compatibility/2006" xmlns:a14="http://schemas.microsoft.com/office/drawing/2010/main">
+        <mc:Choice Requires="a14">
           <p:sp>
             <p:nvSpPr>
               <p:cNvPr id="46" name="TextBox 45">
@@ -11785,7 +11784,7 @@
             </p:txBody>
           </p:sp>
         </mc:Choice>
-        <mc:Fallback>
+        <mc:Fallback xmlns="">
           <p:sp>
             <p:nvSpPr>
               <p:cNvPr id="46" name="TextBox 45">
@@ -11830,8 +11829,8 @@
           </p:sp>
         </mc:Fallback>
       </mc:AlternateContent>
-      <mc:AlternateContent xmlns:mc="http://schemas.openxmlformats.org/markup-compatibility/2006">
-        <mc:Choice xmlns:a14="http://schemas.microsoft.com/office/drawing/2010/main" Requires="a14">
+      <mc:AlternateContent xmlns:mc="http://schemas.openxmlformats.org/markup-compatibility/2006" xmlns:a14="http://schemas.microsoft.com/office/drawing/2010/main">
+        <mc:Choice Requires="a14">
           <p:sp>
             <p:nvSpPr>
               <p:cNvPr id="47" name="TextBox 46">
@@ -11892,7 +11891,7 @@
             </p:txBody>
           </p:sp>
         </mc:Choice>
-        <mc:Fallback>
+        <mc:Fallback xmlns="">
           <p:sp>
             <p:nvSpPr>
               <p:cNvPr id="47" name="TextBox 46">
@@ -11937,8 +11936,8 @@
           </p:sp>
         </mc:Fallback>
       </mc:AlternateContent>
-      <mc:AlternateContent xmlns:mc="http://schemas.openxmlformats.org/markup-compatibility/2006">
-        <mc:Choice xmlns:a14="http://schemas.microsoft.com/office/drawing/2010/main" Requires="a14">
+      <mc:AlternateContent xmlns:mc="http://schemas.openxmlformats.org/markup-compatibility/2006" xmlns:a14="http://schemas.microsoft.com/office/drawing/2010/main">
+        <mc:Choice Requires="a14">
           <p:sp>
             <p:nvSpPr>
               <p:cNvPr id="48" name="TextBox 47">
@@ -12032,7 +12031,7 @@
             </p:txBody>
           </p:sp>
         </mc:Choice>
-        <mc:Fallback>
+        <mc:Fallback xmlns="">
           <p:sp>
             <p:nvSpPr>
               <p:cNvPr id="48" name="TextBox 47">
@@ -12171,8 +12170,8 @@
           </a:fontRef>
         </p:style>
       </p:cxnSp>
-      <mc:AlternateContent xmlns:mc="http://schemas.openxmlformats.org/markup-compatibility/2006">
-        <mc:Choice xmlns:a14="http://schemas.microsoft.com/office/drawing/2010/main" Requires="a14">
+      <mc:AlternateContent xmlns:mc="http://schemas.openxmlformats.org/markup-compatibility/2006" xmlns:a14="http://schemas.microsoft.com/office/drawing/2010/main">
+        <mc:Choice Requires="a14">
           <p:sp>
             <p:nvSpPr>
               <p:cNvPr id="51" name="TextBox 50">
@@ -12260,7 +12259,7 @@
             </p:txBody>
           </p:sp>
         </mc:Choice>
-        <mc:Fallback>
+        <mc:Fallback xmlns="">
           <p:sp>
             <p:nvSpPr>
               <p:cNvPr id="51" name="TextBox 50">
@@ -12305,8 +12304,8 @@
           </p:sp>
         </mc:Fallback>
       </mc:AlternateContent>
-      <mc:AlternateContent xmlns:mc="http://schemas.openxmlformats.org/markup-compatibility/2006">
-        <mc:Choice xmlns:a14="http://schemas.microsoft.com/office/drawing/2010/main" Requires="a14">
+      <mc:AlternateContent xmlns:mc="http://schemas.openxmlformats.org/markup-compatibility/2006" xmlns:a14="http://schemas.microsoft.com/office/drawing/2010/main">
+        <mc:Choice Requires="a14">
           <p:sp>
             <p:nvSpPr>
               <p:cNvPr id="52" name="TextBox 51">
@@ -12369,7 +12368,7 @@
             </p:txBody>
           </p:sp>
         </mc:Choice>
-        <mc:Fallback>
+        <mc:Fallback xmlns="">
           <p:sp>
             <p:nvSpPr>
               <p:cNvPr id="52" name="TextBox 51">
@@ -12414,8 +12413,8 @@
           </p:sp>
         </mc:Fallback>
       </mc:AlternateContent>
-      <mc:AlternateContent xmlns:mc="http://schemas.openxmlformats.org/markup-compatibility/2006">
-        <mc:Choice xmlns:a14="http://schemas.microsoft.com/office/drawing/2010/main" Requires="a14">
+      <mc:AlternateContent xmlns:mc="http://schemas.openxmlformats.org/markup-compatibility/2006" xmlns:a14="http://schemas.microsoft.com/office/drawing/2010/main">
+        <mc:Choice Requires="a14">
           <p:sp>
             <p:nvSpPr>
               <p:cNvPr id="54" name="TextBox 53">
@@ -12501,7 +12500,7 @@
             </p:txBody>
           </p:sp>
         </mc:Choice>
-        <mc:Fallback>
+        <mc:Fallback xmlns="">
           <p:sp>
             <p:nvSpPr>
               <p:cNvPr id="54" name="TextBox 53">
@@ -12644,8 +12643,8 @@
           </a:fontRef>
         </p:style>
       </p:cxnSp>
-      <mc:AlternateContent xmlns:mc="http://schemas.openxmlformats.org/markup-compatibility/2006">
-        <mc:Choice xmlns:a14="http://schemas.microsoft.com/office/drawing/2010/main" Requires="a14">
+      <mc:AlternateContent xmlns:mc="http://schemas.openxmlformats.org/markup-compatibility/2006" xmlns:a14="http://schemas.microsoft.com/office/drawing/2010/main">
+        <mc:Choice Requires="a14">
           <p:sp>
             <p:nvSpPr>
               <p:cNvPr id="63" name="TextBox 62">
@@ -12705,7 +12704,7 @@
             </p:txBody>
           </p:sp>
         </mc:Choice>
-        <mc:Fallback>
+        <mc:Fallback xmlns="">
           <p:sp>
             <p:nvSpPr>
               <p:cNvPr id="63" name="TextBox 62">
@@ -12750,8 +12749,8 @@
           </p:sp>
         </mc:Fallback>
       </mc:AlternateContent>
-      <mc:AlternateContent xmlns:mc="http://schemas.openxmlformats.org/markup-compatibility/2006">
-        <mc:Choice xmlns:a14="http://schemas.microsoft.com/office/drawing/2010/main" Requires="a14">
+      <mc:AlternateContent xmlns:mc="http://schemas.openxmlformats.org/markup-compatibility/2006" xmlns:a14="http://schemas.microsoft.com/office/drawing/2010/main">
+        <mc:Choice Requires="a14">
           <p:sp>
             <p:nvSpPr>
               <p:cNvPr id="64" name="TextBox 63">
@@ -12811,7 +12810,7 @@
             </p:txBody>
           </p:sp>
         </mc:Choice>
-        <mc:Fallback>
+        <mc:Fallback xmlns="">
           <p:sp>
             <p:nvSpPr>
               <p:cNvPr id="64" name="TextBox 63">
@@ -12856,8 +12855,8 @@
           </p:sp>
         </mc:Fallback>
       </mc:AlternateContent>
-      <mc:AlternateContent xmlns:mc="http://schemas.openxmlformats.org/markup-compatibility/2006">
-        <mc:Choice xmlns:a14="http://schemas.microsoft.com/office/drawing/2010/main" Requires="a14">
+      <mc:AlternateContent xmlns:mc="http://schemas.openxmlformats.org/markup-compatibility/2006" xmlns:a14="http://schemas.microsoft.com/office/drawing/2010/main">
+        <mc:Choice Requires="a14">
           <p:sp>
             <p:nvSpPr>
               <p:cNvPr id="65" name="TextBox 64">
@@ -12917,7 +12916,7 @@
             </p:txBody>
           </p:sp>
         </mc:Choice>
-        <mc:Fallback>
+        <mc:Fallback xmlns="">
           <p:sp>
             <p:nvSpPr>
               <p:cNvPr id="65" name="TextBox 64">
@@ -12992,8 +12991,8 @@
           <a:chExt cx="0" cy="0"/>
         </a:xfrm>
       </p:grpSpPr>
-      <mc:AlternateContent xmlns:mc="http://schemas.openxmlformats.org/markup-compatibility/2006">
-        <mc:Choice xmlns:a14="http://schemas.microsoft.com/office/drawing/2010/main" Requires="a14">
+      <mc:AlternateContent xmlns:mc="http://schemas.openxmlformats.org/markup-compatibility/2006" xmlns:a14="http://schemas.microsoft.com/office/drawing/2010/main">
+        <mc:Choice Requires="a14">
           <p:sp>
             <p:nvSpPr>
               <p:cNvPr id="4" name="TextBox 3">
@@ -13097,7 +13096,7 @@
             </p:txBody>
           </p:sp>
         </mc:Choice>
-        <mc:Fallback>
+        <mc:Fallback xmlns="">
           <p:sp>
             <p:nvSpPr>
               <p:cNvPr id="4" name="TextBox 3">
@@ -13142,8 +13141,8 @@
           </p:sp>
         </mc:Fallback>
       </mc:AlternateContent>
-      <mc:AlternateContent xmlns:mc="http://schemas.openxmlformats.org/markup-compatibility/2006">
-        <mc:Choice xmlns:a14="http://schemas.microsoft.com/office/drawing/2010/main" Requires="a14">
+      <mc:AlternateContent xmlns:mc="http://schemas.openxmlformats.org/markup-compatibility/2006" xmlns:a14="http://schemas.microsoft.com/office/drawing/2010/main">
+        <mc:Choice Requires="a14">
           <p:sp>
             <p:nvSpPr>
               <p:cNvPr id="5" name="TextBox 4">
@@ -13229,7 +13228,7 @@
             </p:txBody>
           </p:sp>
         </mc:Choice>
-        <mc:Fallback>
+        <mc:Fallback xmlns="">
           <p:sp>
             <p:nvSpPr>
               <p:cNvPr id="5" name="TextBox 4">
@@ -13291,7 +13290,7 @@
             <p:spPr>
               <a:xfrm>
                 <a:off x="6019034" y="1873473"/>
-                <a:ext cx="652007" cy="898323"/>
+                <a:ext cx="652007" cy="802912"/>
               </a:xfrm>
               <a:prstGeom prst="rect">
                 <a:avLst/>
@@ -13314,7 +13313,7 @@
                       <m:f>
                         <m:fPr>
                           <m:ctrlPr>
-                            <a:rPr lang="ru-RU" sz="1400" i="1" smtClean="0">
+                            <a:rPr lang="ru-RU" sz="1100" i="1" smtClean="0">
                               <a:effectLst/>
                               <a:latin typeface="Cambria Math" panose="02040503050406030204" pitchFamily="18" charset="0"/>
                               <a:ea typeface="Calibri" panose="020F0502020204030204" pitchFamily="34" charset="0"/>
@@ -13324,20 +13323,21 @@
                         </m:fPr>
                         <m:num>
                           <m:r>
-                            <a:rPr lang="en-US" sz="1400" i="1">
-                              <a:effectLst/>
+                            <m:rPr>
+                              <m:sty m:val="p"/>
+                            </m:rPr>
+                            <a:rPr lang="ru-RU" sz="1400">
                               <a:latin typeface="Cambria Math" panose="02040503050406030204" pitchFamily="18" charset="0"/>
-                              <a:ea typeface="Calibri" panose="020F0502020204030204" pitchFamily="34" charset="0"/>
-                              <a:cs typeface="Times New Roman" panose="02020603050405020304" pitchFamily="18" charset="0"/>
+                              <a:ea typeface="Cambria Math" panose="02040503050406030204" pitchFamily="18" charset="0"/>
                             </a:rPr>
-                            <m:t>1</m:t>
+                            <m:t>ε</m:t>
                           </m:r>
                         </m:num>
                         <m:den>
                           <m:sSub>
                             <m:sSubPr>
                               <m:ctrlPr>
-                                <a:rPr lang="ru-RU" sz="1400" i="1">
+                                <a:rPr lang="ru-RU" sz="1100" i="1">
                                   <a:effectLst/>
                                   <a:latin typeface="Cambria Math" panose="02040503050406030204" pitchFamily="18" charset="0"/>
                                   <a:ea typeface="Calibri" panose="020F0502020204030204" pitchFamily="34" charset="0"/>
@@ -13347,7 +13347,7 @@
                             </m:sSubPr>
                             <m:e>
                               <m:r>
-                                <a:rPr lang="ru-RU" sz="1400" b="0" i="1" smtClean="0">
+                                <a:rPr lang="ru-RU" sz="1100" b="0" i="1" smtClean="0">
                                   <a:effectLst/>
                                   <a:latin typeface="Cambria Math" panose="02040503050406030204" pitchFamily="18" charset="0"/>
                                   <a:ea typeface="Calibri" panose="020F0502020204030204" pitchFamily="34" charset="0"/>
@@ -13356,7 +13356,7 @@
                                 <m:t>(</m:t>
                               </m:r>
                               <m:r>
-                                <a:rPr lang="en-US" sz="1400" i="1">
+                                <a:rPr lang="en-US" sz="1100" i="1">
                                   <a:effectLst/>
                                   <a:latin typeface="Cambria Math" panose="02040503050406030204" pitchFamily="18" charset="0"/>
                                   <a:ea typeface="Calibri" panose="020F0502020204030204" pitchFamily="34" charset="0"/>
@@ -13367,7 +13367,7 @@
                             </m:e>
                             <m:sub>
                               <m:r>
-                                <a:rPr lang="ru-RU" sz="1400" b="0" i="1" smtClean="0">
+                                <a:rPr lang="ru-RU" sz="1100" b="0" i="1" smtClean="0">
                                   <a:effectLst/>
                                   <a:latin typeface="Cambria Math" panose="02040503050406030204" pitchFamily="18" charset="0"/>
                                   <a:ea typeface="Calibri" panose="020F0502020204030204" pitchFamily="34" charset="0"/>
@@ -13378,7 +13378,7 @@
                             </m:sub>
                           </m:sSub>
                           <m:r>
-                            <a:rPr lang="ru-RU" sz="1400" b="0" i="1" smtClean="0">
+                            <a:rPr lang="ru-RU" sz="1100" b="0" i="1" smtClean="0">
                               <a:effectLst/>
                               <a:latin typeface="Cambria Math" panose="02040503050406030204" pitchFamily="18" charset="0"/>
                               <a:ea typeface="Calibri" panose="020F0502020204030204" pitchFamily="34" charset="0"/>
@@ -13389,7 +13389,7 @@
                           <m:sSub>
                             <m:sSubPr>
                               <m:ctrlPr>
-                                <a:rPr lang="ru-RU" sz="1400" i="1">
+                                <a:rPr lang="ru-RU" sz="1100" i="1">
                                   <a:latin typeface="Cambria Math" panose="02040503050406030204" pitchFamily="18" charset="0"/>
                                   <a:ea typeface="Calibri" panose="020F0502020204030204" pitchFamily="34" charset="0"/>
                                   <a:cs typeface="Times New Roman" panose="02020603050405020304" pitchFamily="18" charset="0"/>
@@ -13398,7 +13398,7 @@
                             </m:sSubPr>
                             <m:e>
                               <m:r>
-                                <a:rPr lang="en-US" sz="1400" i="1">
+                                <a:rPr lang="en-US" sz="1100" i="1">
                                   <a:latin typeface="Cambria Math" panose="02040503050406030204" pitchFamily="18" charset="0"/>
                                   <a:ea typeface="Calibri" panose="020F0502020204030204" pitchFamily="34" charset="0"/>
                                   <a:cs typeface="Times New Roman" panose="02020603050405020304" pitchFamily="18" charset="0"/>
@@ -13408,7 +13408,7 @@
                             </m:e>
                             <m:sub>
                               <m:r>
-                                <a:rPr lang="ru-RU" sz="1400" b="0" i="1" smtClean="0">
+                                <a:rPr lang="ru-RU" sz="1100" b="0" i="1" smtClean="0">
                                   <a:latin typeface="Cambria Math" panose="02040503050406030204" pitchFamily="18" charset="0"/>
                                   <a:ea typeface="Calibri" panose="020F0502020204030204" pitchFamily="34" charset="0"/>
                                   <a:cs typeface="Times New Roman" panose="02020603050405020304" pitchFamily="18" charset="0"/>
@@ -13418,7 +13418,7 @@
                             </m:sub>
                           </m:sSub>
                           <m:r>
-                            <a:rPr lang="ru-RU" sz="1400" b="0" i="1" smtClean="0">
+                            <a:rPr lang="ru-RU" sz="1100" b="0" i="1" smtClean="0">
                               <a:effectLst/>
                               <a:latin typeface="Cambria Math" panose="02040503050406030204" pitchFamily="18" charset="0"/>
                               <a:ea typeface="Calibri" panose="020F0502020204030204" pitchFamily="34" charset="0"/>
@@ -13427,7 +13427,7 @@
                             <m:t>)</m:t>
                           </m:r>
                           <m:r>
-                            <a:rPr lang="en-US" sz="1400" i="1">
+                            <a:rPr lang="en-US" sz="1100" i="1">
                               <a:effectLst/>
                               <a:latin typeface="Cambria Math" panose="02040503050406030204" pitchFamily="18" charset="0"/>
                               <a:ea typeface="Calibri" panose="020F0502020204030204" pitchFamily="34" charset="0"/>
@@ -13479,7 +13479,7 @@
             <p:spPr>
               <a:xfrm>
                 <a:off x="6019034" y="1873473"/>
-                <a:ext cx="652007" cy="898323"/>
+                <a:ext cx="652007" cy="802912"/>
               </a:xfrm>
               <a:prstGeom prst="rect">
                 <a:avLst/>
@@ -13487,7 +13487,7 @@
               <a:blipFill>
                 <a:blip r:embed="rId4"/>
                 <a:stretch>
-                  <a:fillRect l="-11215" r="-5607"/>
+                  <a:fillRect/>
                 </a:stretch>
               </a:blipFill>
             </p:spPr>
@@ -13506,8 +13506,8 @@
           </p:sp>
         </mc:Fallback>
       </mc:AlternateContent>
-      <mc:AlternateContent xmlns:mc="http://schemas.openxmlformats.org/markup-compatibility/2006">
-        <mc:Choice xmlns:a14="http://schemas.microsoft.com/office/drawing/2010/main" Requires="a14">
+      <mc:AlternateContent xmlns:mc="http://schemas.openxmlformats.org/markup-compatibility/2006" xmlns:a14="http://schemas.microsoft.com/office/drawing/2010/main">
+        <mc:Choice Requires="a14">
           <p:sp>
             <p:nvSpPr>
               <p:cNvPr id="7" name="TextBox 6">
@@ -13601,7 +13601,7 @@
             </p:txBody>
           </p:sp>
         </mc:Choice>
-        <mc:Fallback>
+        <mc:Fallback xmlns="">
           <p:sp>
             <p:nvSpPr>
               <p:cNvPr id="7" name="TextBox 6">
@@ -13646,8 +13646,8 @@
           </p:sp>
         </mc:Fallback>
       </mc:AlternateContent>
-      <mc:AlternateContent xmlns:mc="http://schemas.openxmlformats.org/markup-compatibility/2006">
-        <mc:Choice xmlns:a14="http://schemas.microsoft.com/office/drawing/2010/main" Requires="a14">
+      <mc:AlternateContent xmlns:mc="http://schemas.openxmlformats.org/markup-compatibility/2006" xmlns:a14="http://schemas.microsoft.com/office/drawing/2010/main">
+        <mc:Choice Requires="a14">
           <p:sp>
             <p:nvSpPr>
               <p:cNvPr id="8" name="TextBox 7">
@@ -13751,7 +13751,7 @@
             </p:txBody>
           </p:sp>
         </mc:Choice>
-        <mc:Fallback>
+        <mc:Fallback xmlns="">
           <p:sp>
             <p:nvSpPr>
               <p:cNvPr id="8" name="TextBox 7">
@@ -14006,8 +14006,8 @@
           </a:p>
         </p:txBody>
       </p:sp>
-      <mc:AlternateContent xmlns:mc="http://schemas.openxmlformats.org/markup-compatibility/2006">
-        <mc:Choice xmlns:a14="http://schemas.microsoft.com/office/drawing/2010/main" Requires="a14">
+      <mc:AlternateContent xmlns:mc="http://schemas.openxmlformats.org/markup-compatibility/2006" xmlns:a14="http://schemas.microsoft.com/office/drawing/2010/main">
+        <mc:Choice Requires="a14">
           <p:sp>
             <p:nvSpPr>
               <p:cNvPr id="19" name="TextBox 18">
@@ -14093,7 +14093,7 @@
             </p:txBody>
           </p:sp>
         </mc:Choice>
-        <mc:Fallback>
+        <mc:Fallback xmlns="">
           <p:sp>
             <p:nvSpPr>
               <p:cNvPr id="19" name="TextBox 18">
@@ -14564,8 +14564,8 @@
           </a:fontRef>
         </p:style>
       </p:cxnSp>
-      <mc:AlternateContent xmlns:mc="http://schemas.openxmlformats.org/markup-compatibility/2006">
-        <mc:Choice xmlns:a14="http://schemas.microsoft.com/office/drawing/2010/main" Requires="a14">
+      <mc:AlternateContent xmlns:mc="http://schemas.openxmlformats.org/markup-compatibility/2006" xmlns:a14="http://schemas.microsoft.com/office/drawing/2010/main">
+        <mc:Choice Requires="a14">
           <p:sp>
             <p:nvSpPr>
               <p:cNvPr id="29" name="TextBox 28">
@@ -14651,7 +14651,7 @@
             </p:txBody>
           </p:sp>
         </mc:Choice>
-        <mc:Fallback>
+        <mc:Fallback xmlns="">
           <p:sp>
             <p:nvSpPr>
               <p:cNvPr id="29" name="TextBox 28">
@@ -14899,8 +14899,8 @@
           </a:p>
         </p:txBody>
       </p:sp>
-      <mc:AlternateContent xmlns:mc="http://schemas.openxmlformats.org/markup-compatibility/2006">
-        <mc:Choice xmlns:a14="http://schemas.microsoft.com/office/drawing/2010/main" Requires="a14">
+      <mc:AlternateContent xmlns:mc="http://schemas.openxmlformats.org/markup-compatibility/2006" xmlns:a14="http://schemas.microsoft.com/office/drawing/2010/main">
+        <mc:Choice Requires="a14">
           <p:sp>
             <p:nvSpPr>
               <p:cNvPr id="34" name="TextBox 33">
@@ -14986,7 +14986,7 @@
             </p:txBody>
           </p:sp>
         </mc:Choice>
-        <mc:Fallback>
+        <mc:Fallback xmlns="">
           <p:sp>
             <p:nvSpPr>
               <p:cNvPr id="34" name="TextBox 33">
@@ -15165,8 +15165,8 @@
           </a:fontRef>
         </p:style>
       </p:cxnSp>
-      <mc:AlternateContent xmlns:mc="http://schemas.openxmlformats.org/markup-compatibility/2006">
-        <mc:Choice xmlns:a14="http://schemas.microsoft.com/office/drawing/2010/main" Requires="a14">
+      <mc:AlternateContent xmlns:mc="http://schemas.openxmlformats.org/markup-compatibility/2006" xmlns:a14="http://schemas.microsoft.com/office/drawing/2010/main">
+        <mc:Choice Requires="a14">
           <p:sp>
             <p:nvSpPr>
               <p:cNvPr id="39" name="TextBox 38">
@@ -15254,7 +15254,7 @@
             </p:txBody>
           </p:sp>
         </mc:Choice>
-        <mc:Fallback>
+        <mc:Fallback xmlns="">
           <p:sp>
             <p:nvSpPr>
               <p:cNvPr id="39" name="TextBox 38">
@@ -15299,8 +15299,8 @@
           </p:sp>
         </mc:Fallback>
       </mc:AlternateContent>
-      <mc:AlternateContent xmlns:mc="http://schemas.openxmlformats.org/markup-compatibility/2006">
-        <mc:Choice xmlns:a14="http://schemas.microsoft.com/office/drawing/2010/main" Requires="a14">
+      <mc:AlternateContent xmlns:mc="http://schemas.openxmlformats.org/markup-compatibility/2006" xmlns:a14="http://schemas.microsoft.com/office/drawing/2010/main">
+        <mc:Choice Requires="a14">
           <p:sp>
             <p:nvSpPr>
               <p:cNvPr id="40" name="TextBox 39">
@@ -15361,7 +15361,7 @@
             </p:txBody>
           </p:sp>
         </mc:Choice>
-        <mc:Fallback>
+        <mc:Fallback xmlns="">
           <p:sp>
             <p:nvSpPr>
               <p:cNvPr id="40" name="TextBox 39">
@@ -15434,7 +15434,6 @@
           </a:bodyPr>
           <a:lstStyle/>
           <a:p>
-            <a:pPr/>
             <a:endParaRPr lang="ru-RU" sz="1400" dirty="0">
               <a:effectLst/>
               <a:latin typeface="Times New Roman" panose="02020603050405020304" pitchFamily="18" charset="0"/>
@@ -15447,8 +15446,8 @@
           </a:p>
         </p:txBody>
       </p:sp>
-      <mc:AlternateContent xmlns:mc="http://schemas.openxmlformats.org/markup-compatibility/2006">
-        <mc:Choice xmlns:a14="http://schemas.microsoft.com/office/drawing/2010/main" Requires="a14">
+      <mc:AlternateContent xmlns:mc="http://schemas.openxmlformats.org/markup-compatibility/2006" xmlns:a14="http://schemas.microsoft.com/office/drawing/2010/main">
+        <mc:Choice Requires="a14">
           <p:sp>
             <p:nvSpPr>
               <p:cNvPr id="42" name="TextBox 41">
@@ -15532,7 +15531,7 @@
             </p:txBody>
           </p:sp>
         </mc:Choice>
-        <mc:Fallback>
+        <mc:Fallback xmlns="">
           <p:sp>
             <p:nvSpPr>
               <p:cNvPr id="42" name="TextBox 41">
@@ -15577,8 +15576,8 @@
           </p:sp>
         </mc:Fallback>
       </mc:AlternateContent>
-      <mc:AlternateContent xmlns:mc="http://schemas.openxmlformats.org/markup-compatibility/2006">
-        <mc:Choice xmlns:a14="http://schemas.microsoft.com/office/drawing/2010/main" Requires="a14">
+      <mc:AlternateContent xmlns:mc="http://schemas.openxmlformats.org/markup-compatibility/2006" xmlns:a14="http://schemas.microsoft.com/office/drawing/2010/main">
+        <mc:Choice Requires="a14">
           <p:sp>
             <p:nvSpPr>
               <p:cNvPr id="43" name="TextBox 42">
@@ -15639,7 +15638,7 @@
             </p:txBody>
           </p:sp>
         </mc:Choice>
-        <mc:Fallback>
+        <mc:Fallback xmlns="">
           <p:sp>
             <p:nvSpPr>
               <p:cNvPr id="43" name="TextBox 42">
@@ -15684,8 +15683,8 @@
           </p:sp>
         </mc:Fallback>
       </mc:AlternateContent>
-      <mc:AlternateContent xmlns:mc="http://schemas.openxmlformats.org/markup-compatibility/2006">
-        <mc:Choice xmlns:a14="http://schemas.microsoft.com/office/drawing/2010/main" Requires="a14">
+      <mc:AlternateContent xmlns:mc="http://schemas.openxmlformats.org/markup-compatibility/2006" xmlns:a14="http://schemas.microsoft.com/office/drawing/2010/main">
+        <mc:Choice Requires="a14">
           <p:sp>
             <p:nvSpPr>
               <p:cNvPr id="44" name="TextBox 43">
@@ -15779,7 +15778,7 @@
             </p:txBody>
           </p:sp>
         </mc:Choice>
-        <mc:Fallback>
+        <mc:Fallback xmlns="">
           <p:sp>
             <p:nvSpPr>
               <p:cNvPr id="44" name="TextBox 43">
@@ -15918,8 +15917,8 @@
           </a:fontRef>
         </p:style>
       </p:cxnSp>
-      <mc:AlternateContent xmlns:mc="http://schemas.openxmlformats.org/markup-compatibility/2006">
-        <mc:Choice xmlns:a14="http://schemas.microsoft.com/office/drawing/2010/main" Requires="a14">
+      <mc:AlternateContent xmlns:mc="http://schemas.openxmlformats.org/markup-compatibility/2006" xmlns:a14="http://schemas.microsoft.com/office/drawing/2010/main">
+        <mc:Choice Requires="a14">
           <p:sp>
             <p:nvSpPr>
               <p:cNvPr id="47" name="TextBox 46">
@@ -16007,7 +16006,7 @@
             </p:txBody>
           </p:sp>
         </mc:Choice>
-        <mc:Fallback>
+        <mc:Fallback xmlns="">
           <p:sp>
             <p:nvSpPr>
               <p:cNvPr id="47" name="TextBox 46">
@@ -16052,8 +16051,8 @@
           </p:sp>
         </mc:Fallback>
       </mc:AlternateContent>
-      <mc:AlternateContent xmlns:mc="http://schemas.openxmlformats.org/markup-compatibility/2006">
-        <mc:Choice xmlns:a14="http://schemas.microsoft.com/office/drawing/2010/main" Requires="a14">
+      <mc:AlternateContent xmlns:mc="http://schemas.openxmlformats.org/markup-compatibility/2006" xmlns:a14="http://schemas.microsoft.com/office/drawing/2010/main">
+        <mc:Choice Requires="a14">
           <p:sp>
             <p:nvSpPr>
               <p:cNvPr id="48" name="TextBox 47">
@@ -16116,7 +16115,7 @@
             </p:txBody>
           </p:sp>
         </mc:Choice>
-        <mc:Fallback>
+        <mc:Fallback xmlns="">
           <p:sp>
             <p:nvSpPr>
               <p:cNvPr id="48" name="TextBox 47">
@@ -16161,8 +16160,8 @@
           </p:sp>
         </mc:Fallback>
       </mc:AlternateContent>
-      <mc:AlternateContent xmlns:mc="http://schemas.openxmlformats.org/markup-compatibility/2006">
-        <mc:Choice xmlns:a14="http://schemas.microsoft.com/office/drawing/2010/main" Requires="a14">
+      <mc:AlternateContent xmlns:mc="http://schemas.openxmlformats.org/markup-compatibility/2006" xmlns:a14="http://schemas.microsoft.com/office/drawing/2010/main">
+        <mc:Choice Requires="a14">
           <p:sp>
             <p:nvSpPr>
               <p:cNvPr id="49" name="TextBox 48">
@@ -16266,7 +16265,7 @@
             </p:txBody>
           </p:sp>
         </mc:Choice>
-        <mc:Fallback>
+        <mc:Fallback xmlns="">
           <p:sp>
             <p:nvSpPr>
               <p:cNvPr id="49" name="TextBox 48">
@@ -16452,8 +16451,8 @@
           </a:fontRef>
         </p:style>
       </p:cxnSp>
-      <mc:AlternateContent xmlns:mc="http://schemas.openxmlformats.org/markup-compatibility/2006">
-        <mc:Choice xmlns:a14="http://schemas.microsoft.com/office/drawing/2010/main" Requires="a14">
+      <mc:AlternateContent xmlns:mc="http://schemas.openxmlformats.org/markup-compatibility/2006" xmlns:a14="http://schemas.microsoft.com/office/drawing/2010/main">
+        <mc:Choice Requires="a14">
           <p:sp>
             <p:nvSpPr>
               <p:cNvPr id="53" name="TextBox 52">
@@ -16482,6 +16481,7 @@
               </a:bodyPr>
               <a:lstStyle/>
               <a:p>
+                <a:pPr/>
                 <a14:m>
                   <m:oMathPara xmlns:m="http://schemas.openxmlformats.org/officeDocument/2006/math">
                     <m:oMathParaPr>
@@ -16539,7 +16539,6 @@
                 <a:endParaRPr lang="ru-RU" dirty="0"/>
               </a:p>
               <a:p>
-                <a:pPr/>
                 <a:endParaRPr lang="ru-RU" sz="1400" dirty="0">
                   <a:effectLst/>
                   <a:latin typeface="Times New Roman" panose="02020603050405020304" pitchFamily="18" charset="0"/>
@@ -16553,7 +16552,7 @@
             </p:txBody>
           </p:sp>
         </mc:Choice>
-        <mc:Fallback>
+        <mc:Fallback xmlns="">
           <p:sp>
             <p:nvSpPr>
               <p:cNvPr id="53" name="TextBox 52">
@@ -16786,8 +16785,8 @@
           </a:fontRef>
         </p:style>
       </p:cxnSp>
-      <mc:AlternateContent xmlns:mc="http://schemas.openxmlformats.org/markup-compatibility/2006">
-        <mc:Choice xmlns:a14="http://schemas.microsoft.com/office/drawing/2010/main" Requires="a14">
+      <mc:AlternateContent xmlns:mc="http://schemas.openxmlformats.org/markup-compatibility/2006" xmlns:a14="http://schemas.microsoft.com/office/drawing/2010/main">
+        <mc:Choice Requires="a14">
           <p:sp>
             <p:nvSpPr>
               <p:cNvPr id="58" name="TextBox 57">
@@ -16873,7 +16872,7 @@
             </p:txBody>
           </p:sp>
         </mc:Choice>
-        <mc:Fallback>
+        <mc:Fallback xmlns="">
           <p:sp>
             <p:nvSpPr>
               <p:cNvPr id="58" name="TextBox 57">
@@ -17015,8 +17014,8 @@
           </a:fontRef>
         </p:style>
       </p:cxnSp>
-      <mc:AlternateContent xmlns:mc="http://schemas.openxmlformats.org/markup-compatibility/2006">
-        <mc:Choice xmlns:a14="http://schemas.microsoft.com/office/drawing/2010/main" Requires="a14">
+      <mc:AlternateContent xmlns:mc="http://schemas.openxmlformats.org/markup-compatibility/2006" xmlns:a14="http://schemas.microsoft.com/office/drawing/2010/main">
+        <mc:Choice Requires="a14">
           <p:sp>
             <p:nvSpPr>
               <p:cNvPr id="68" name="TextBox 67">
@@ -17076,7 +17075,7 @@
             </p:txBody>
           </p:sp>
         </mc:Choice>
-        <mc:Fallback>
+        <mc:Fallback xmlns="">
           <p:sp>
             <p:nvSpPr>
               <p:cNvPr id="68" name="TextBox 67">
@@ -17121,8 +17120,8 @@
           </p:sp>
         </mc:Fallback>
       </mc:AlternateContent>
-      <mc:AlternateContent xmlns:mc="http://schemas.openxmlformats.org/markup-compatibility/2006">
-        <mc:Choice xmlns:a14="http://schemas.microsoft.com/office/drawing/2010/main" Requires="a14">
+      <mc:AlternateContent xmlns:mc="http://schemas.openxmlformats.org/markup-compatibility/2006" xmlns:a14="http://schemas.microsoft.com/office/drawing/2010/main">
+        <mc:Choice Requires="a14">
           <p:sp>
             <p:nvSpPr>
               <p:cNvPr id="69" name="TextBox 68">
@@ -17182,7 +17181,7 @@
             </p:txBody>
           </p:sp>
         </mc:Choice>
-        <mc:Fallback>
+        <mc:Fallback xmlns="">
           <p:sp>
             <p:nvSpPr>
               <p:cNvPr id="69" name="TextBox 68">
@@ -17227,8 +17226,8 @@
           </p:sp>
         </mc:Fallback>
       </mc:AlternateContent>
-      <mc:AlternateContent xmlns:mc="http://schemas.openxmlformats.org/markup-compatibility/2006">
-        <mc:Choice xmlns:a14="http://schemas.microsoft.com/office/drawing/2010/main" Requires="a14">
+      <mc:AlternateContent xmlns:mc="http://schemas.openxmlformats.org/markup-compatibility/2006" xmlns:a14="http://schemas.microsoft.com/office/drawing/2010/main">
+        <mc:Choice Requires="a14">
           <p:sp>
             <p:nvSpPr>
               <p:cNvPr id="70" name="TextBox 69">
@@ -17288,7 +17287,7 @@
             </p:txBody>
           </p:sp>
         </mc:Choice>
-        <mc:Fallback>
+        <mc:Fallback xmlns="">
           <p:sp>
             <p:nvSpPr>
               <p:cNvPr id="70" name="TextBox 69">

</xml_diff>